<commit_message>
updated expose and slides
</commit_message>
<xml_diff>
--- a/Latex/Initialpraesentation_Zangerl_Dominik.pptx
+++ b/Latex/Initialpraesentation_Zangerl_Dominik.pptx
@@ -19,7 +19,7 @@
     <p:sldId id="274" r:id="rId10"/>
     <p:sldId id="275" r:id="rId11"/>
     <p:sldId id="271" r:id="rId12"/>
-    <p:sldId id="272" r:id="rId13"/>
+    <p:sldId id="276" r:id="rId13"/>
     <p:sldId id="265" r:id="rId14"/>
     <p:sldId id="262" r:id="rId15"/>
   </p:sldIdLst>
@@ -221,7 +221,7 @@
           <a:p>
             <a:fld id="{842CE5A1-857B-214D-8BEE-AF65CEFCD544}" type="datetimeFigureOut">
               <a:rPr lang="de-DE" smtClean="0"/>
-              <a:t>16.03.2021</a:t>
+              <a:t>19.03.2021</a:t>
             </a:fld>
             <a:endParaRPr lang="de-DE"/>
           </a:p>
@@ -730,7 +730,7 @@
     </p:spTree>
     <p:extLst>
       <p:ext uri="{BB962C8B-B14F-4D97-AF65-F5344CB8AC3E}">
-        <p14:creationId xmlns:p14="http://schemas.microsoft.com/office/powerpoint/2010/main" val="2795268372"/>
+        <p14:creationId xmlns:p14="http://schemas.microsoft.com/office/powerpoint/2010/main" val="2230865963"/>
       </p:ext>
     </p:extLst>
   </p:cSld>
@@ -3834,7 +3834,7 @@
           <a:p>
             <a:r>
               <a:rPr lang="en-AT" dirty="0"/>
-              <a:t>React</a:t>
+              <a:t>Frontend</a:t>
             </a:r>
             <a:endParaRPr lang="de-DE" dirty="0"/>
           </a:p>
@@ -4826,7 +4826,7 @@
         <p:spPr/>
         <p:txBody>
           <a:bodyPr>
-            <a:normAutofit/>
+            <a:normAutofit lnSpcReduction="10000"/>
           </a:bodyPr>
           <a:lstStyle/>
           <a:p>
@@ -4874,7 +4874,7 @@
               <a:rPr lang="de-DE" sz="1900" dirty="0">
                 <a:latin typeface="+mj-lt"/>
               </a:rPr>
-              <a:t>Falls trotzdem zu viel Arbeit – Präsentation Anfang des nächsten Semesters</a:t>
+              <a:t>Falls sich als zu viel Arbeit herausstellt – Präsentation Anfang des nächsten Semesters</a:t>
             </a:r>
           </a:p>
           <a:p>
@@ -4886,7 +4886,18 @@
             <a:endParaRPr lang="de-DE" sz="1800" dirty="0"/>
           </a:p>
           <a:p>
-            <a:pPr marL="342900" indent="-342900">
+            <a:pPr>
+              <a:lnSpc>
+                <a:spcPct val="100000"/>
+              </a:lnSpc>
+            </a:pPr>
+            <a:r>
+              <a:rPr lang="de-DE" sz="1800" dirty="0"/>
+              <a:t>3 geplante Meilensteine:</a:t>
+            </a:r>
+          </a:p>
+          <a:p>
+            <a:pPr marL="627063" indent="-269875">
               <a:lnSpc>
                 <a:spcPct val="100000"/>
               </a:lnSpc>
@@ -4895,11 +4906,11 @@
             </a:pPr>
             <a:r>
               <a:rPr lang="de-DE" sz="1800" dirty="0"/>
-              <a:t>Beginn mit Parser und arithmetischen Operation + Visualisierung zum Testen</a:t>
-            </a:r>
-          </a:p>
-          <a:p>
-            <a:pPr marL="342900" indent="-342900">
+              <a:t>Parser und arithmetischen Operation + Visualisierung zum Testen</a:t>
+            </a:r>
+          </a:p>
+          <a:p>
+            <a:pPr marL="627063" indent="-269875">
               <a:lnSpc>
                 <a:spcPct val="100000"/>
               </a:lnSpc>
@@ -4908,11 +4919,11 @@
             </a:pPr>
             <a:r>
               <a:rPr lang="de-DE" sz="1800" dirty="0"/>
-              <a:t>Restliche ARMv5 Instruktionen und Beginn Theorie der Bachelorarbeit</a:t>
-            </a:r>
-          </a:p>
-          <a:p>
-            <a:pPr marL="342900" indent="-342900">
+              <a:t>Restliche ARMv5 Instruktionen und Benutzeroberfläche</a:t>
+            </a:r>
+          </a:p>
+          <a:p>
+            <a:pPr marL="627063" indent="-269875">
               <a:lnSpc>
                 <a:spcPct val="100000"/>
               </a:lnSpc>
@@ -5538,6 +5549,55 @@
                       </p:childTnLst>
                     </p:cTn>
                   </p:par>
+                  <p:par>
+                    <p:cTn id="21" fill="hold">
+                      <p:stCondLst>
+                        <p:cond delay="indefinite"/>
+                      </p:stCondLst>
+                      <p:childTnLst>
+                        <p:par>
+                          <p:cTn id="22" fill="hold">
+                            <p:stCondLst>
+                              <p:cond delay="0"/>
+                            </p:stCondLst>
+                            <p:childTnLst>
+                              <p:par>
+                                <p:cTn id="23" presetID="1" presetClass="entr" presetSubtype="0" fill="hold" nodeType="clickEffect">
+                                  <p:stCondLst>
+                                    <p:cond delay="0"/>
+                                  </p:stCondLst>
+                                  <p:childTnLst>
+                                    <p:set>
+                                      <p:cBhvr>
+                                        <p:cTn id="24" dur="1" fill="hold">
+                                          <p:stCondLst>
+                                            <p:cond delay="0"/>
+                                          </p:stCondLst>
+                                        </p:cTn>
+                                        <p:tgtEl>
+                                          <p:spTgt spid="12">
+                                            <p:txEl>
+                                              <p:pRg st="8" end="8"/>
+                                            </p:txEl>
+                                          </p:spTgt>
+                                        </p:tgtEl>
+                                        <p:attrNameLst>
+                                          <p:attrName>style.visibility</p:attrName>
+                                        </p:attrNameLst>
+                                      </p:cBhvr>
+                                      <p:to>
+                                        <p:strVal val="visible"/>
+                                      </p:to>
+                                    </p:set>
+                                  </p:childTnLst>
+                                </p:cTn>
+                              </p:par>
+                            </p:childTnLst>
+                          </p:cTn>
+                        </p:par>
+                      </p:childTnLst>
+                    </p:cTn>
+                  </p:par>
                 </p:childTnLst>
               </p:cTn>
               <p:prevCondLst>
@@ -5597,7 +5657,7 @@
           <a:p>
             <a:r>
               <a:rPr lang="de-DE" dirty="0"/>
-              <a:t>Voraussetzungen:</a:t>
+              <a:t>Voraussetzungen und optionale Ziele:</a:t>
             </a:r>
           </a:p>
         </p:txBody>
@@ -5615,13 +5675,13 @@
         <p:spPr/>
         <p:txBody>
           <a:bodyPr>
-            <a:normAutofit/>
+            <a:normAutofit lnSpcReduction="10000"/>
           </a:bodyPr>
           <a:lstStyle/>
           <a:p>
             <a:pPr marL="800100" lvl="1" indent="-342900" algn="l">
               <a:lnSpc>
-                <a:spcPct val="150000"/>
+                <a:spcPct val="100000"/>
               </a:lnSpc>
               <a:buFont typeface="Arial" panose="020B0604020202020204" pitchFamily="34" charset="0"/>
               <a:buChar char="•"/>
@@ -5651,7 +5711,7 @@
           <a:p>
             <a:pPr marL="800100" lvl="1" indent="-342900" algn="l">
               <a:lnSpc>
-                <a:spcPct val="150000"/>
+                <a:spcPct val="100000"/>
               </a:lnSpc>
               <a:buFont typeface="Arial" panose="020B0604020202020204" pitchFamily="34" charset="0"/>
               <a:buChar char="•"/>
@@ -5694,7 +5754,7 @@
           <a:p>
             <a:pPr marL="800100" lvl="1" indent="-342900" algn="l">
               <a:lnSpc>
-                <a:spcPct val="150000"/>
+                <a:spcPct val="100000"/>
               </a:lnSpc>
               <a:buFont typeface="Arial" panose="020B0604020202020204" pitchFamily="34" charset="0"/>
               <a:buChar char="•"/>
@@ -5731,7 +5791,7 @@
           <a:p>
             <a:pPr marL="800100" lvl="1" indent="-342900" algn="l">
               <a:lnSpc>
-                <a:spcPct val="150000"/>
+                <a:spcPct val="100000"/>
               </a:lnSpc>
               <a:buFont typeface="Arial" panose="020B0604020202020204" pitchFamily="34" charset="0"/>
               <a:buChar char="•"/>
@@ -5740,8 +5800,128 @@
               <a:rPr lang="de-DE" sz="1900" dirty="0">
                 <a:latin typeface="+mj-lt"/>
               </a:rPr>
-              <a:t>Die korrekte Funktionsweise wird mit den Musterlösungen der Beispiele aus dem Proseminar getestet.</a:t>
-            </a:r>
+              <a:t>Die korrekte Funktionsweise wird mit</a:t>
+            </a:r>
+            <a:r>
+              <a:rPr lang="en-AT" sz="1900" dirty="0">
+                <a:latin typeface="+mj-lt"/>
+              </a:rPr>
+              <a:t> </a:t>
+            </a:r>
+            <a:r>
+              <a:rPr lang="de-DE" sz="1900" dirty="0">
+                <a:latin typeface="+mj-lt"/>
+              </a:rPr>
+              <a:t>Musterlösungen der Beispiele aus dem Proseminar getestet.</a:t>
+            </a:r>
+            <a:endParaRPr lang="en-AT" sz="1900" dirty="0">
+              <a:latin typeface="+mj-lt"/>
+            </a:endParaRPr>
+          </a:p>
+          <a:p>
+            <a:pPr marL="800100" lvl="1" indent="-342900" algn="l">
+              <a:lnSpc>
+                <a:spcPct val="100000"/>
+              </a:lnSpc>
+              <a:buFont typeface="Arial" panose="020B0604020202020204" pitchFamily="34" charset="0"/>
+              <a:buChar char="•"/>
+            </a:pPr>
+            <a:endParaRPr lang="en-AT" sz="1900" dirty="0">
+              <a:latin typeface="+mj-lt"/>
+            </a:endParaRPr>
+          </a:p>
+          <a:p>
+            <a:pPr marL="800100" lvl="1" indent="-342900" algn="l">
+              <a:lnSpc>
+                <a:spcPct val="100000"/>
+              </a:lnSpc>
+              <a:buFont typeface="Arial" panose="020B0604020202020204" pitchFamily="34" charset="0"/>
+              <a:buChar char="•"/>
+            </a:pPr>
+            <a:r>
+              <a:rPr lang="de-DE" sz="1900" dirty="0">
+                <a:latin typeface="+mj-lt"/>
+              </a:rPr>
+              <a:t>Das Erstellen von Vorlagen</a:t>
+            </a:r>
+            <a:r>
+              <a:rPr lang="en-AT" sz="1900" dirty="0">
+                <a:latin typeface="+mj-lt"/>
+              </a:rPr>
+              <a:t>/Skeletons</a:t>
+            </a:r>
+            <a:r>
+              <a:rPr lang="de-DE" sz="1900" dirty="0">
+                <a:latin typeface="+mj-lt"/>
+              </a:rPr>
+              <a:t> für die PS-Aufgaben</a:t>
+            </a:r>
+            <a:r>
+              <a:rPr lang="en-AT" sz="1900" dirty="0">
+                <a:latin typeface="+mj-lt"/>
+              </a:rPr>
+              <a:t> </a:t>
+            </a:r>
+            <a:r>
+              <a:rPr lang="de-DE" sz="1900" dirty="0">
+                <a:latin typeface="+mj-lt"/>
+              </a:rPr>
+              <a:t>und</a:t>
+            </a:r>
+            <a:r>
+              <a:rPr lang="en-AT" sz="1900" dirty="0">
+                <a:latin typeface="+mj-lt"/>
+              </a:rPr>
+              <a:t> </a:t>
+            </a:r>
+            <a:r>
+              <a:rPr lang="de-DE" sz="1900" dirty="0">
+                <a:latin typeface="+mj-lt"/>
+              </a:rPr>
+              <a:t>Überprüfung der Korrektheit im Hintergrund</a:t>
+            </a:r>
+            <a:r>
+              <a:rPr lang="en-AT" sz="1900" dirty="0">
+                <a:latin typeface="+mj-lt"/>
+              </a:rPr>
+              <a:t>. (optional)</a:t>
+            </a:r>
+          </a:p>
+          <a:p>
+            <a:pPr marL="800100" lvl="1" indent="-342900" algn="l">
+              <a:lnSpc>
+                <a:spcPct val="100000"/>
+              </a:lnSpc>
+              <a:buFont typeface="Arial" panose="020B0604020202020204" pitchFamily="34" charset="0"/>
+              <a:buChar char="•"/>
+            </a:pPr>
+            <a:r>
+              <a:rPr lang="de-DE" sz="1900" dirty="0">
+                <a:latin typeface="+mj-lt"/>
+              </a:rPr>
+              <a:t>Die Implementierung einer automatischen Code-Vervollständigung mit Hinweisen zur</a:t>
+            </a:r>
+            <a:r>
+              <a:rPr lang="en-AT" sz="1900" dirty="0">
+                <a:latin typeface="+mj-lt"/>
+              </a:rPr>
+              <a:t> </a:t>
+            </a:r>
+            <a:r>
+              <a:rPr lang="de-DE" sz="1900" dirty="0">
+                <a:latin typeface="+mj-lt"/>
+              </a:rPr>
+              <a:t>Verwendung der eingetippten Instruktionen</a:t>
+            </a:r>
+            <a:r>
+              <a:rPr lang="en-AT" sz="1900" dirty="0">
+                <a:latin typeface="+mj-lt"/>
+              </a:rPr>
+              <a:t>. (optional)</a:t>
+            </a:r>
+            <a:endParaRPr lang="de-DE" sz="1900" dirty="0">
+              <a:latin typeface="+mj-lt"/>
+            </a:endParaRPr>
           </a:p>
         </p:txBody>
       </p:sp>
@@ -6102,7 +6282,7 @@
     </p:spTree>
     <p:extLst>
       <p:ext uri="{BB962C8B-B14F-4D97-AF65-F5344CB8AC3E}">
-        <p14:creationId xmlns:p14="http://schemas.microsoft.com/office/powerpoint/2010/main" val="4162308095"/>
+        <p14:creationId xmlns:p14="http://schemas.microsoft.com/office/powerpoint/2010/main" val="1452770154"/>
       </p:ext>
     </p:extLst>
   </p:cSld>
@@ -6264,6 +6444,104 @@
                       </p:childTnLst>
                     </p:cTn>
                   </p:par>
+                  <p:par>
+                    <p:cTn id="15" fill="hold">
+                      <p:stCondLst>
+                        <p:cond delay="indefinite"/>
+                      </p:stCondLst>
+                      <p:childTnLst>
+                        <p:par>
+                          <p:cTn id="16" fill="hold">
+                            <p:stCondLst>
+                              <p:cond delay="0"/>
+                            </p:stCondLst>
+                            <p:childTnLst>
+                              <p:par>
+                                <p:cTn id="17" presetID="1" presetClass="entr" presetSubtype="0" fill="hold" nodeType="clickEffect">
+                                  <p:stCondLst>
+                                    <p:cond delay="0"/>
+                                  </p:stCondLst>
+                                  <p:childTnLst>
+                                    <p:set>
+                                      <p:cBhvr>
+                                        <p:cTn id="18" dur="1" fill="hold">
+                                          <p:stCondLst>
+                                            <p:cond delay="0"/>
+                                          </p:stCondLst>
+                                        </p:cTn>
+                                        <p:tgtEl>
+                                          <p:spTgt spid="12">
+                                            <p:txEl>
+                                              <p:pRg st="5" end="5"/>
+                                            </p:txEl>
+                                          </p:spTgt>
+                                        </p:tgtEl>
+                                        <p:attrNameLst>
+                                          <p:attrName>style.visibility</p:attrName>
+                                        </p:attrNameLst>
+                                      </p:cBhvr>
+                                      <p:to>
+                                        <p:strVal val="visible"/>
+                                      </p:to>
+                                    </p:set>
+                                  </p:childTnLst>
+                                </p:cTn>
+                              </p:par>
+                            </p:childTnLst>
+                          </p:cTn>
+                        </p:par>
+                      </p:childTnLst>
+                    </p:cTn>
+                  </p:par>
+                  <p:par>
+                    <p:cTn id="19" fill="hold">
+                      <p:stCondLst>
+                        <p:cond delay="indefinite"/>
+                      </p:stCondLst>
+                      <p:childTnLst>
+                        <p:par>
+                          <p:cTn id="20" fill="hold">
+                            <p:stCondLst>
+                              <p:cond delay="0"/>
+                            </p:stCondLst>
+                            <p:childTnLst>
+                              <p:par>
+                                <p:cTn id="21" presetID="1" presetClass="entr" presetSubtype="0" fill="hold" nodeType="clickEffect">
+                                  <p:stCondLst>
+                                    <p:cond delay="0"/>
+                                  </p:stCondLst>
+                                  <p:childTnLst>
+                                    <p:set>
+                                      <p:cBhvr>
+                                        <p:cTn id="22" dur="1" fill="hold">
+                                          <p:stCondLst>
+                                            <p:cond delay="0"/>
+                                          </p:stCondLst>
+                                        </p:cTn>
+                                        <p:tgtEl>
+                                          <p:spTgt spid="12">
+                                            <p:txEl>
+                                              <p:pRg st="6" end="6"/>
+                                            </p:txEl>
+                                          </p:spTgt>
+                                        </p:tgtEl>
+                                        <p:attrNameLst>
+                                          <p:attrName>style.visibility</p:attrName>
+                                        </p:attrNameLst>
+                                      </p:cBhvr>
+                                      <p:to>
+                                        <p:strVal val="visible"/>
+                                      </p:to>
+                                    </p:set>
+                                  </p:childTnLst>
+                                </p:cTn>
+                              </p:par>
+                            </p:childTnLst>
+                          </p:cTn>
+                        </p:par>
+                      </p:childTnLst>
+                    </p:cTn>
+                  </p:par>
                 </p:childTnLst>
               </p:cTn>
               <p:prevCondLst>
@@ -6342,7 +6620,7 @@
         <p:spPr/>
         <p:txBody>
           <a:bodyPr>
-            <a:normAutofit fontScale="92500"/>
+            <a:normAutofit fontScale="85000" lnSpcReduction="20000"/>
           </a:bodyPr>
           <a:lstStyle/>
           <a:p>
@@ -6353,7 +6631,15 @@
             </a:pPr>
             <a:r>
               <a:rPr lang="en-US" sz="1400" dirty="0"/>
-              <a:t>[1] ARM Limited. GNU Toolchain for Arm processors. </a:t>
+              <a:t>[1] ARM Limited. GNU Toolchain for A</a:t>
+            </a:r>
+            <a:r>
+              <a:rPr lang="en-AT" sz="1400" dirty="0"/>
+              <a:t>RM</a:t>
+            </a:r>
+            <a:r>
+              <a:rPr lang="en-US" sz="1400" dirty="0"/>
+              <a:t> processors. </a:t>
             </a:r>
             <a:r>
               <a:rPr lang="en-US" sz="1400" dirty="0" err="1"/>
@@ -6394,46 +6680,20 @@
               </a:lnSpc>
             </a:pPr>
             <a:r>
-              <a:rPr lang="de-DE" sz="1400" dirty="0"/>
-              <a:t>[3] E. Davey. </a:t>
-            </a:r>
-            <a:r>
-              <a:rPr lang="de-DE" sz="1400" dirty="0" err="1"/>
-              <a:t>tsPEG</a:t>
-            </a:r>
-            <a:r>
-              <a:rPr lang="de-DE" sz="1400" dirty="0"/>
-              <a:t>: A PEG Parser Generator </a:t>
-            </a:r>
-            <a:r>
-              <a:rPr lang="de-DE" sz="1400" dirty="0" err="1"/>
-              <a:t>for</a:t>
-            </a:r>
-            <a:r>
-              <a:rPr lang="de-DE" sz="1400" dirty="0"/>
-              <a:t> </a:t>
-            </a:r>
-            <a:r>
-              <a:rPr lang="de-DE" sz="1400" dirty="0" err="1"/>
-              <a:t>TypeScript</a:t>
-            </a:r>
-            <a:r>
-              <a:rPr lang="de-DE" sz="1400" dirty="0"/>
-              <a:t>. Zugegriffen am: 04.03.2021.</a:t>
+              <a:rPr lang="en-AT" sz="1400" dirty="0"/>
+              <a:t>[3] </a:t>
+            </a:r>
+            <a:r>
+              <a:rPr lang="en-US" sz="1400" dirty="0"/>
+              <a:t>G. Bierman, M. Abadi, and M. Torgersen. Understanding TypeScript. In ECOOP 2014</a:t>
             </a:r>
             <a:r>
               <a:rPr lang="en-AT" sz="1400" dirty="0"/>
               <a:t> </a:t>
             </a:r>
             <a:r>
-              <a:rPr lang="de-DE" sz="1400" dirty="0">
-                <a:hlinkClick r:id="rId4"/>
-              </a:rPr>
-              <a:t>https://github.com/EoinDavey/tsPEG</a:t>
-            </a:r>
-            <a:r>
-              <a:rPr lang="de-DE" sz="1400" dirty="0"/>
-              <a:t>.</a:t>
+              <a:rPr lang="en-US" sz="1400" dirty="0"/>
+              <a:t>– Object-Oriented Programming, pages 257–281, 2014.</a:t>
             </a:r>
             <a:endParaRPr lang="en-AT" sz="1400" dirty="0"/>
           </a:p>
@@ -6445,21 +6705,49 @@
             </a:pPr>
             <a:r>
               <a:rPr lang="de-DE" sz="1400" dirty="0"/>
-              <a:t>[4] Facebook. </a:t>
+              <a:t>[</a:t>
+            </a:r>
+            <a:r>
+              <a:rPr lang="en-AT" sz="1400" dirty="0"/>
+              <a:t>4</a:t>
+            </a:r>
+            <a:r>
+              <a:rPr lang="de-DE" sz="1400" dirty="0"/>
+              <a:t>] E. Davey. </a:t>
             </a:r>
             <a:r>
               <a:rPr lang="de-DE" sz="1400" dirty="0" err="1"/>
-              <a:t>React</a:t>
+              <a:t>tsPEG</a:t>
             </a:r>
             <a:r>
               <a:rPr lang="de-DE" sz="1400" dirty="0"/>
-              <a:t>. Zugegriffen am: 04.03.2021. </a:t>
+              <a:t>: A PEG Parser Generator </a:t>
+            </a:r>
+            <a:r>
+              <a:rPr lang="de-DE" sz="1400" dirty="0" err="1"/>
+              <a:t>for</a:t>
+            </a:r>
+            <a:r>
+              <a:rPr lang="de-DE" sz="1400" dirty="0"/>
+              <a:t> </a:t>
+            </a:r>
+            <a:r>
+              <a:rPr lang="de-DE" sz="1400" dirty="0" err="1"/>
+              <a:t>TypeScript</a:t>
+            </a:r>
+            <a:r>
+              <a:rPr lang="de-DE" sz="1400" dirty="0"/>
+              <a:t>. Zugegriffen am: 04.03.2021.</a:t>
+            </a:r>
+            <a:r>
+              <a:rPr lang="en-AT" sz="1400" dirty="0"/>
+              <a:t> </a:t>
             </a:r>
             <a:r>
               <a:rPr lang="de-DE" sz="1400" dirty="0">
-                <a:hlinkClick r:id="rId5"/>
-              </a:rPr>
-              <a:t>https://reactjs.org/</a:t>
+                <a:hlinkClick r:id="rId4"/>
+              </a:rPr>
+              <a:t>https://github.com/EoinDavey/tsPEG</a:t>
             </a:r>
             <a:r>
               <a:rPr lang="de-DE" sz="1400" dirty="0"/>
@@ -6483,11 +6771,11 @@
             </a:r>
             <a:r>
               <a:rPr lang="de-DE" sz="1400" dirty="0"/>
-              <a:t>] Microsoft. </a:t>
+              <a:t>] Facebook. </a:t>
             </a:r>
             <a:r>
               <a:rPr lang="de-DE" sz="1400" dirty="0" err="1"/>
-              <a:t>Typescript</a:t>
+              <a:t>React</a:t>
             </a:r>
             <a:r>
               <a:rPr lang="de-DE" sz="1400" dirty="0"/>
@@ -6495,9 +6783,9 @@
             </a:r>
             <a:r>
               <a:rPr lang="de-DE" sz="1400" dirty="0">
-                <a:hlinkClick r:id="rId6"/>
-              </a:rPr>
-              <a:t>https://www.typescriptlang.org/</a:t>
+                <a:hlinkClick r:id="rId5"/>
+              </a:rPr>
+              <a:t>https://reactjs.org/</a:t>
             </a:r>
             <a:r>
               <a:rPr lang="de-DE" sz="1400" dirty="0"/>
@@ -6512,34 +6800,20 @@
               </a:lnSpc>
             </a:pPr>
             <a:r>
-              <a:rPr lang="de-DE" sz="1400" dirty="0"/>
-              <a:t>[</a:t>
-            </a:r>
-            <a:r>
               <a:rPr lang="en-AT" sz="1400" dirty="0"/>
-              <a:t>6</a:t>
-            </a:r>
-            <a:r>
-              <a:rPr lang="de-DE" sz="1400" dirty="0"/>
-              <a:t>] Microsoft. Windows Subsystem </a:t>
-            </a:r>
-            <a:r>
-              <a:rPr lang="de-DE" sz="1400" dirty="0" err="1"/>
-              <a:t>for</a:t>
-            </a:r>
-            <a:r>
-              <a:rPr lang="de-DE" sz="1400" dirty="0"/>
-              <a:t> Linux. Zugegriffen am: 04.03.2021. </a:t>
-            </a:r>
-            <a:r>
-              <a:rPr lang="de-DE" sz="1400" dirty="0">
-                <a:hlinkClick r:id="rId7"/>
-              </a:rPr>
-              <a:t>https://docs.microsoft.com/en-us/windows/wsl/install-win10</a:t>
-            </a:r>
-            <a:r>
-              <a:rPr lang="de-DE" sz="1400" dirty="0"/>
-              <a:t>.</a:t>
+              <a:t>[6] </a:t>
+            </a:r>
+            <a:r>
+              <a:rPr lang="en-US" sz="1400" dirty="0"/>
+              <a:t>B. Ford. Parsing Expression Grammars: A Recognition-Based Syntactic Foundation.</a:t>
+            </a:r>
+            <a:r>
+              <a:rPr lang="en-AT" sz="1400" dirty="0"/>
+              <a:t> </a:t>
+            </a:r>
+            <a:r>
+              <a:rPr lang="en-US" sz="1400" dirty="0"/>
+              <a:t>SIGPLAN Not., 39(1):111–122, January 2004.</a:t>
             </a:r>
             <a:endParaRPr lang="en-AT" sz="1400" dirty="0"/>
           </a:p>
@@ -6550,18 +6824,38 @@
               </a:lnSpc>
             </a:pPr>
             <a:r>
+              <a:rPr lang="de-DE" sz="1400" dirty="0"/>
+              <a:t>[</a:t>
+            </a:r>
+            <a:r>
               <a:rPr lang="en-AT" sz="1400" dirty="0"/>
-              <a:t>[7] J. Mossberg. Use GDB on an ARM assembly program. </a:t>
+              <a:t>7</a:t>
             </a:r>
             <a:r>
               <a:rPr lang="de-DE" sz="1400" dirty="0"/>
-              <a:t>Zugegriffen am: 04.03.2021. </a:t>
+              <a:t>] Microsoft. Type</a:t>
+            </a:r>
+            <a:r>
+              <a:rPr lang="en-AT" sz="1400" dirty="0"/>
+              <a:t>S</a:t>
+            </a:r>
+            <a:r>
+              <a:rPr lang="de-DE" sz="1400" dirty="0" err="1"/>
+              <a:t>cript</a:t>
+            </a:r>
+            <a:r>
+              <a:rPr lang="de-DE" sz="1400" dirty="0"/>
+              <a:t>. Zugegriffen am: 04.03.2021. </a:t>
             </a:r>
             <a:r>
               <a:rPr lang="de-DE" sz="1400" dirty="0">
-                <a:hlinkClick r:id="rId8"/>
-              </a:rPr>
-              <a:t>https://jacobmossberg.se/posts/2017/01/17/use-gdb-on-arm-assembly-program.html</a:t>
+                <a:hlinkClick r:id="rId6"/>
+              </a:rPr>
+              <a:t>https://www.typescriptlang.org/</a:t>
+            </a:r>
+            <a:r>
+              <a:rPr lang="de-DE" sz="1400" dirty="0"/>
+              <a:t>.</a:t>
             </a:r>
             <a:endParaRPr lang="en-AT" sz="1400" dirty="0"/>
           </a:p>
@@ -6581,17 +6875,21 @@
             </a:r>
             <a:r>
               <a:rPr lang="de-DE" sz="1400" dirty="0"/>
-              <a:t>] The GNU Project. GDB: The GNU Project Debugger. Zugegriffen am: 04.03.2021.</a:t>
-            </a:r>
-            <a:r>
-              <a:rPr lang="en-AT" sz="1400" dirty="0"/>
-              <a:t> </a:t>
+              <a:t>] Microsoft. Windows Subsystem </a:t>
+            </a:r>
+            <a:r>
+              <a:rPr lang="de-DE" sz="1400" dirty="0" err="1"/>
+              <a:t>for</a:t>
+            </a:r>
+            <a:r>
+              <a:rPr lang="de-DE" sz="1400" dirty="0"/>
+              <a:t> Linux. Zugegriffen am: 04.03.2021. </a:t>
             </a:r>
             <a:r>
               <a:rPr lang="de-DE" sz="1400" dirty="0">
-                <a:hlinkClick r:id="rId9"/>
-              </a:rPr>
-              <a:t>https://www.gnu.org/software/gdb/</a:t>
+                <a:hlinkClick r:id="rId7"/>
+              </a:rPr>
+              <a:t>https://docs.microsoft.com/en-us/windows/wsl/install-win10</a:t>
             </a:r>
             <a:r>
               <a:rPr lang="de-DE" sz="1400" dirty="0"/>
@@ -6606,12 +6904,68 @@
               </a:lnSpc>
             </a:pPr>
             <a:r>
+              <a:rPr lang="en-AT" sz="1400" dirty="0"/>
+              <a:t>[9] J. Mossberg. Use GDB on an ARM assembly program. </a:t>
+            </a:r>
+            <a:r>
+              <a:rPr lang="de-DE" sz="1400" dirty="0"/>
+              <a:t>Zugegriffen am: 04.03.2021. </a:t>
+            </a:r>
+            <a:r>
+              <a:rPr lang="de-DE" sz="1400" dirty="0">
+                <a:hlinkClick r:id="rId8"/>
+              </a:rPr>
+              <a:t>https://jacobmossberg.se/posts/2017/01/17/use-gdb-on-arm-assembly-program.html</a:t>
+            </a:r>
+            <a:endParaRPr lang="en-AT" sz="1400" dirty="0"/>
+          </a:p>
+          <a:p>
+            <a:pPr>
+              <a:lnSpc>
+                <a:spcPct val="100000"/>
+              </a:lnSpc>
+            </a:pPr>
+            <a:r>
               <a:rPr lang="de-DE" sz="1400" dirty="0"/>
               <a:t>[</a:t>
             </a:r>
             <a:r>
               <a:rPr lang="en-AT" sz="1400" dirty="0"/>
-              <a:t>9</a:t>
+              <a:t>10</a:t>
+            </a:r>
+            <a:r>
+              <a:rPr lang="de-DE" sz="1400" dirty="0"/>
+              <a:t>] The GNU Project. GDB: The GNU Project Debugger. Zugegriffen am: 04.03.2021.</a:t>
+            </a:r>
+            <a:r>
+              <a:rPr lang="en-AT" sz="1400" dirty="0"/>
+              <a:t> </a:t>
+            </a:r>
+            <a:r>
+              <a:rPr lang="de-DE" sz="1400" dirty="0">
+                <a:hlinkClick r:id="rId9"/>
+              </a:rPr>
+              <a:t>https://www.gnu.org/software/gdb/</a:t>
+            </a:r>
+            <a:r>
+              <a:rPr lang="de-DE" sz="1400" dirty="0"/>
+              <a:t>.</a:t>
+            </a:r>
+            <a:endParaRPr lang="en-AT" sz="1400" dirty="0"/>
+          </a:p>
+          <a:p>
+            <a:pPr>
+              <a:lnSpc>
+                <a:spcPct val="100000"/>
+              </a:lnSpc>
+            </a:pPr>
+            <a:r>
+              <a:rPr lang="de-DE" sz="1400" dirty="0"/>
+              <a:t>[</a:t>
+            </a:r>
+            <a:r>
+              <a:rPr lang="en-AT" sz="1400" dirty="0"/>
+              <a:t>11</a:t>
             </a:r>
             <a:r>
               <a:rPr lang="de-DE" sz="1400" dirty="0"/>
@@ -6639,7 +6993,7 @@
               <a:rPr lang="de-DE" sz="1400" dirty="0"/>
               <a:t>.</a:t>
             </a:r>
-            <a:endParaRPr lang="en-AT" sz="1400"/>
+            <a:endParaRPr lang="en-AT" sz="1400" dirty="0"/>
           </a:p>
           <a:p>
             <a:pPr>
@@ -6879,7 +7233,11 @@
               <a:buChar char="•"/>
             </a:pPr>
             <a:r>
-              <a:rPr lang="de-DE" dirty="0"/>
+              <a:rPr lang="de-DE" dirty="0">
+                <a:solidFill>
+                  <a:schemeClr val="tx1"/>
+                </a:solidFill>
+              </a:rPr>
               <a:t>Motivation</a:t>
             </a:r>
           </a:p>
@@ -6895,7 +7253,6 @@
               <a:rPr lang="de-DE" dirty="0"/>
               <a:t>Implementation und Technologien</a:t>
             </a:r>
-            <a:endParaRPr lang="en-AT" dirty="0"/>
           </a:p>
           <a:p>
             <a:pPr marL="800100" lvl="1" indent="-342900" algn="l">
@@ -6907,13 +7264,13 @@
             </a:pPr>
             <a:r>
               <a:rPr lang="en-AT" sz="1900" dirty="0">
+                <a:solidFill>
+                  <a:srgbClr val="343433"/>
+                </a:solidFill>
                 <a:latin typeface="+mj-lt"/>
               </a:rPr>
-              <a:t>Typescript</a:t>
-            </a:r>
-            <a:endParaRPr lang="de-DE" sz="1900" dirty="0">
-              <a:latin typeface="+mj-lt"/>
-            </a:endParaRPr>
+              <a:t>Backend</a:t>
+            </a:r>
           </a:p>
           <a:p>
             <a:pPr marL="800100" lvl="1" indent="-342900" algn="l">
@@ -6924,7 +7281,10 @@
               <a:buChar char="•"/>
             </a:pPr>
             <a:r>
-              <a:rPr lang="en-AT" sz="1900" dirty="0">
+              <a:rPr lang="de-DE" sz="1900" dirty="0">
+                <a:solidFill>
+                  <a:srgbClr val="343433"/>
+                </a:solidFill>
                 <a:latin typeface="+mj-lt"/>
               </a:rPr>
               <a:t>Parser</a:t>
@@ -6939,14 +7299,14 @@
               <a:buChar char="•"/>
             </a:pPr>
             <a:r>
-              <a:rPr lang="en-AT" sz="1900" dirty="0">
+              <a:rPr lang="de-DE" sz="1900" dirty="0">
+                <a:solidFill>
+                  <a:srgbClr val="343433"/>
+                </a:solidFill>
                 <a:latin typeface="+mj-lt"/>
               </a:rPr>
               <a:t>Simulator und Debugger</a:t>
             </a:r>
-            <a:endParaRPr lang="de-DE" sz="1900" dirty="0">
-              <a:latin typeface="+mj-lt"/>
-            </a:endParaRPr>
           </a:p>
           <a:p>
             <a:pPr marL="800100" lvl="1" indent="-342900" algn="l">
@@ -6957,14 +7317,14 @@
               <a:buChar char="•"/>
             </a:pPr>
             <a:r>
-              <a:rPr lang="en-AT" sz="1900" dirty="0">
+              <a:rPr lang="de-DE" sz="1900" dirty="0">
+                <a:solidFill>
+                  <a:srgbClr val="343433"/>
+                </a:solidFill>
                 <a:latin typeface="+mj-lt"/>
               </a:rPr>
-              <a:t>Frontend/React</a:t>
-            </a:r>
-            <a:endParaRPr lang="de-DE" sz="1900" dirty="0">
-              <a:latin typeface="+mj-lt"/>
-            </a:endParaRPr>
+              <a:t>Frontend</a:t>
+            </a:r>
           </a:p>
           <a:p>
             <a:pPr marL="342900" indent="-342900">
@@ -6991,7 +7351,6 @@
               <a:rPr lang="de-DE" dirty="0"/>
               <a:t>Voraussetzungen für finale Implementierung</a:t>
             </a:r>
-            <a:endParaRPr lang="en-AT" dirty="0"/>
           </a:p>
           <a:p>
             <a:pPr marL="342900" indent="-342900">
@@ -7002,20 +7361,9 @@
               <a:buChar char="•"/>
             </a:pPr>
             <a:r>
-              <a:rPr lang="en-AT" dirty="0" err="1"/>
+              <a:rPr lang="de-DE" dirty="0"/>
               <a:t>Referenzen</a:t>
             </a:r>
-            <a:endParaRPr lang="de-DE" dirty="0"/>
-          </a:p>
-          <a:p>
-            <a:pPr marL="342900" indent="-342900">
-              <a:lnSpc>
-                <a:spcPct val="100000"/>
-              </a:lnSpc>
-              <a:buFont typeface="Arial" panose="020B0604020202020204" pitchFamily="34" charset="0"/>
-              <a:buChar char="•"/>
-            </a:pPr>
-            <a:endParaRPr lang="de-DE" dirty="0"/>
           </a:p>
         </p:txBody>
       </p:sp>
@@ -7172,25 +7520,15 @@
               <a:rPr lang="en-AT" dirty="0">
                 <a:hlinkClick r:id="rId3" action="ppaction://hlinksldjump"/>
               </a:rPr>
-              <a:t>[</a:t>
-            </a:r>
-            <a:r>
-              <a:rPr lang="en-AT">
-                <a:hlinkClick r:id="rId3" action="ppaction://hlinksldjump"/>
-              </a:rPr>
-              <a:t>2]</a:t>
-            </a:r>
-            <a:r>
-              <a:rPr lang="en-AT"/>
+              <a:t>[2]</a:t>
+            </a:r>
+            <a:r>
+              <a:rPr lang="en-AT" dirty="0"/>
               <a:t> </a:t>
             </a:r>
             <a:r>
-              <a:rPr lang="de-DE"/>
-              <a:t>als </a:t>
-            </a:r>
-            <a:r>
               <a:rPr lang="de-DE" dirty="0"/>
-              <a:t>Beispiel einer Befehlssatzarchitektur</a:t>
+              <a:t>als Beispiel einer Befehlssatzarchitektur</a:t>
             </a:r>
           </a:p>
           <a:p>
@@ -7277,7 +7615,7 @@
               <a:rPr lang="en-AT" dirty="0">
                 <a:hlinkClick r:id="rId3" action="ppaction://hlinksldjump"/>
               </a:rPr>
-              <a:t>[9]</a:t>
+              <a:t>[11]</a:t>
             </a:r>
             <a:endParaRPr lang="de-DE" dirty="0"/>
           </a:p>
@@ -7317,18 +7655,8 @@
               <a:rPr lang="en-AT" dirty="0">
                 <a:hlinkClick r:id="rId3" action="ppaction://hlinksldjump"/>
               </a:rPr>
-              <a:t>[6]</a:t>
-            </a:r>
-            <a:endParaRPr lang="de-DE" dirty="0"/>
-          </a:p>
-          <a:p>
-            <a:pPr marL="342900" indent="-342900">
-              <a:lnSpc>
-                <a:spcPct val="100000"/>
-              </a:lnSpc>
-              <a:buFont typeface="Arial" panose="020B0604020202020204" pitchFamily="34" charset="0"/>
-              <a:buChar char="•"/>
-            </a:pPr>
+              <a:t>[8]</a:t>
+            </a:r>
             <a:endParaRPr lang="de-DE" dirty="0"/>
           </a:p>
         </p:txBody>
@@ -8659,24 +8987,35 @@
               <a:buChar char="•"/>
             </a:pPr>
             <a:r>
-              <a:rPr lang="de-DE"/>
+              <a:rPr lang="de-DE" dirty="0"/>
               <a:t>Kann zusammen mit dem Gnu Debugger </a:t>
             </a:r>
             <a:r>
-              <a:rPr lang="de-DE">
+              <a:rPr lang="de-DE" dirty="0">
                 <a:hlinkClick r:id="rId3" action="ppaction://hlinksldjump"/>
               </a:rPr>
-              <a:t>[8]</a:t>
-            </a:r>
-            <a:r>
-              <a:rPr lang="en-AT"/>
+              <a:t>[</a:t>
+            </a:r>
+            <a:r>
+              <a:rPr lang="en-AT" dirty="0">
+                <a:hlinkClick r:id="rId3" action="ppaction://hlinksldjump"/>
+              </a:rPr>
+              <a:t>10</a:t>
+            </a:r>
+            <a:r>
+              <a:rPr lang="de-DE" dirty="0">
+                <a:hlinkClick r:id="rId3" action="ppaction://hlinksldjump"/>
+              </a:rPr>
+              <a:t>]</a:t>
+            </a:r>
+            <a:r>
+              <a:rPr lang="en-AT" dirty="0"/>
               <a:t> </a:t>
             </a:r>
             <a:r>
-              <a:rPr lang="de-DE"/>
+              <a:rPr lang="de-DE" dirty="0"/>
               <a:t>verwendet werden:</a:t>
             </a:r>
-            <a:endParaRPr lang="de-DE" dirty="0"/>
           </a:p>
           <a:p>
             <a:pPr marL="342900" indent="-342900">
@@ -8727,10 +9066,9 @@
               <a:buChar char="•"/>
             </a:pPr>
             <a:r>
-              <a:rPr lang="de-DE"/>
+              <a:rPr lang="de-DE" dirty="0"/>
               <a:t>Arbeiten mit Debuggern im ersten Semester oft schwierig</a:t>
             </a:r>
-            <a:endParaRPr lang="de-DE" dirty="0"/>
           </a:p>
           <a:p>
             <a:pPr marL="342900" indent="-342900">
@@ -8741,8 +9079,12 @@
               <a:buChar char="•"/>
             </a:pPr>
             <a:r>
-              <a:rPr lang="de-DE"/>
-              <a:t>Großer Zeitaufwand zusammen mit Aufsetzen der Toolchain</a:t>
+              <a:rPr lang="de-DE" dirty="0"/>
+              <a:t>Großer Zeitaufwand zusammen mit Aufsetzen der </a:t>
+            </a:r>
+            <a:r>
+              <a:rPr lang="de-DE" dirty="0" err="1"/>
+              <a:t>Toolchain</a:t>
             </a:r>
             <a:endParaRPr lang="de-DE" dirty="0"/>
           </a:p>
@@ -9146,8 +9488,8 @@
         </p:nvSpPr>
         <p:spPr>
           <a:xfrm>
-            <a:off x="2952205" y="4663441"/>
-            <a:ext cx="3647728" cy="307777"/>
+            <a:off x="2700115" y="4656073"/>
+            <a:ext cx="4151907" cy="307777"/>
           </a:xfrm>
           <a:prstGeom prst="rect">
             <a:avLst/>
@@ -9161,14 +9503,18 @@
           <a:lstStyle/>
           <a:p>
             <a:r>
+              <a:rPr lang="en-AT" sz="1400" dirty="0" err="1"/>
+              <a:t>Abbildung</a:t>
+            </a:r>
+            <a:r>
               <a:rPr lang="en-AT" sz="1400" dirty="0"/>
-              <a:t>Bild: Use GDB on an ARM assembly program </a:t>
+              <a:t>: Use GDB on an ARM assembly program </a:t>
             </a:r>
             <a:r>
               <a:rPr lang="en-AT" sz="1400" dirty="0">
                 <a:hlinkClick r:id="rId3" action="ppaction://hlinksldjump"/>
               </a:rPr>
-              <a:t>[7]</a:t>
+              <a:t>[9]</a:t>
             </a:r>
             <a:endParaRPr lang="de-DE" sz="1400" dirty="0"/>
           </a:p>
@@ -9516,10 +9862,9 @@
               <a:buChar char="•"/>
             </a:pPr>
             <a:r>
-              <a:rPr lang="de-DE"/>
+              <a:rPr lang="de-DE" dirty="0"/>
               <a:t>ARMv5 Entwicklungsumgebung</a:t>
             </a:r>
-            <a:endParaRPr lang="de-DE" dirty="0"/>
           </a:p>
           <a:p>
             <a:pPr marL="800100" lvl="1" indent="-342900" algn="l">
@@ -9530,14 +9875,11 @@
               <a:buChar char="•"/>
             </a:pPr>
             <a:r>
-              <a:rPr lang="de-DE" sz="1900">
+              <a:rPr lang="de-DE" sz="1900" dirty="0">
                 <a:latin typeface="+mj-lt"/>
               </a:rPr>
               <a:t>Simulierte CPU und Hauptspeicher</a:t>
             </a:r>
-            <a:endParaRPr lang="de-DE" sz="1900" dirty="0">
-              <a:latin typeface="+mj-lt"/>
-            </a:endParaRPr>
           </a:p>
           <a:p>
             <a:pPr marL="800100" lvl="1" indent="-342900" algn="l">
@@ -9548,36 +9890,22 @@
               <a:buChar char="•"/>
             </a:pPr>
             <a:r>
-              <a:rPr lang="de-DE" sz="1900">
+              <a:rPr lang="de-DE" sz="1900" dirty="0">
                 <a:latin typeface="+mj-lt"/>
               </a:rPr>
-              <a:t>Assembler-Code direkt in Anwendung schreiben</a:t>
-            </a:r>
-            <a:r>
-              <a:rPr lang="en-AT" sz="1900">
+              <a:t>Assembler-Code in Webanwendung schreiben und direkt im Browser</a:t>
+            </a:r>
+            <a:r>
+              <a:rPr lang="en-AT" sz="1900" dirty="0">
                 <a:latin typeface="+mj-lt"/>
               </a:rPr>
-              <a:t> und </a:t>
-            </a:r>
-            <a:r>
-              <a:rPr lang="de-DE" sz="1900">
+              <a:t> </a:t>
+            </a:r>
+            <a:r>
+              <a:rPr lang="en-AT" sz="1900" dirty="0" err="1">
                 <a:latin typeface="+mj-lt"/>
               </a:rPr>
               <a:t>ausführen</a:t>
-            </a:r>
-            <a:r>
-              <a:rPr lang="en-AT" sz="1900">
-                <a:latin typeface="+mj-lt"/>
-                <a:sym typeface="Wingdings" panose="05000000000000000000" pitchFamily="2" charset="2"/>
-              </a:rPr>
-              <a:t> </a:t>
-            </a:r>
-            <a:r>
-              <a:rPr lang="de-DE" sz="1900">
-                <a:latin typeface="+mj-lt"/>
-                <a:sym typeface="Wingdings" panose="05000000000000000000" pitchFamily="2" charset="2"/>
-              </a:rPr>
-              <a:t>ersetzt Toolchain</a:t>
             </a:r>
             <a:endParaRPr lang="de-DE" sz="1900" dirty="0">
               <a:latin typeface="+mj-lt"/>
@@ -9592,14 +9920,11 @@
               <a:buChar char="•"/>
             </a:pPr>
             <a:r>
-              <a:rPr lang="de-DE" sz="1900">
+              <a:rPr lang="de-DE" sz="1900" dirty="0">
                 <a:latin typeface="+mj-lt"/>
               </a:rPr>
               <a:t>Dauerhafte Anzeige von Registern und Stacks</a:t>
             </a:r>
-            <a:endParaRPr lang="de-DE" sz="1900" dirty="0">
-              <a:latin typeface="+mj-lt"/>
-            </a:endParaRPr>
           </a:p>
           <a:p>
             <a:pPr marL="342900" indent="-342900">
@@ -9610,10 +9935,9 @@
               <a:buChar char="•"/>
             </a:pPr>
             <a:r>
-              <a:rPr lang="de-DE"/>
+              <a:rPr lang="de-DE" dirty="0"/>
               <a:t>Debugger</a:t>
             </a:r>
-            <a:endParaRPr lang="de-DE" dirty="0"/>
           </a:p>
           <a:p>
             <a:pPr marL="800100" lvl="1" indent="-342900" algn="l">
@@ -9624,14 +9948,11 @@
               <a:buChar char="•"/>
             </a:pPr>
             <a:r>
-              <a:rPr lang="de-DE" sz="1900">
+              <a:rPr lang="de-DE" sz="1900" dirty="0">
                 <a:latin typeface="+mj-lt"/>
               </a:rPr>
               <a:t>Breakpoints</a:t>
             </a:r>
-            <a:endParaRPr lang="de-DE" sz="1900" dirty="0">
-              <a:latin typeface="+mj-lt"/>
-            </a:endParaRPr>
           </a:p>
           <a:p>
             <a:pPr marL="800100" lvl="1" indent="-342900" algn="l">
@@ -9642,47 +9963,11 @@
               <a:buChar char="•"/>
             </a:pPr>
             <a:r>
-              <a:rPr lang="de-DE" sz="1900">
+              <a:rPr lang="de-DE" sz="1900" dirty="0">
                 <a:latin typeface="+mj-lt"/>
               </a:rPr>
               <a:t>Zeilenweise Abarbeitung</a:t>
             </a:r>
-            <a:endParaRPr lang="de-DE" sz="1900" dirty="0">
-              <a:latin typeface="+mj-lt"/>
-            </a:endParaRPr>
-          </a:p>
-          <a:p>
-            <a:pPr marL="800100" lvl="1" indent="-342900" algn="l">
-              <a:lnSpc>
-                <a:spcPct val="100000"/>
-              </a:lnSpc>
-              <a:buFont typeface="Arial" panose="020B0604020202020204" pitchFamily="34" charset="0"/>
-              <a:buChar char="•"/>
-            </a:pPr>
-            <a:endParaRPr lang="de-DE" dirty="0">
-              <a:latin typeface="+mj-lt"/>
-            </a:endParaRPr>
-          </a:p>
-          <a:p>
-            <a:pPr marL="800100" lvl="1" indent="-342900" algn="l">
-              <a:lnSpc>
-                <a:spcPct val="100000"/>
-              </a:lnSpc>
-              <a:buFont typeface="Arial" panose="020B0604020202020204" pitchFamily="34" charset="0"/>
-              <a:buChar char="•"/>
-            </a:pPr>
-            <a:endParaRPr lang="de-DE" dirty="0">
-              <a:latin typeface="+mj-lt"/>
-            </a:endParaRPr>
-          </a:p>
-          <a:p>
-            <a:pPr marL="800100" lvl="1" indent="-342900" algn="l">
-              <a:lnSpc>
-                <a:spcPct val="100000"/>
-              </a:lnSpc>
-              <a:buFont typeface="Arial" panose="020B0604020202020204" pitchFamily="34" charset="0"/>
-              <a:buChar char="•"/>
-            </a:pPr>
             <a:endParaRPr lang="de-DE" dirty="0">
               <a:latin typeface="+mj-lt"/>
             </a:endParaRPr>
@@ -10463,7 +10748,7 @@
           <a:p>
             <a:r>
               <a:rPr lang="en-AT" dirty="0"/>
-              <a:t>TypeScript</a:t>
+              <a:t>Backend</a:t>
             </a:r>
             <a:endParaRPr lang="de-DE" dirty="0"/>
           </a:p>
@@ -10505,7 +10790,19 @@
               <a:rPr lang="de-DE" dirty="0">
                 <a:hlinkClick r:id="rId3" action="ppaction://hlinksldjump"/>
               </a:rPr>
-              <a:t>[5]</a:t>
+              <a:t>[</a:t>
+            </a:r>
+            <a:r>
+              <a:rPr lang="en-AT" dirty="0">
+                <a:hlinkClick r:id="rId3" action="ppaction://hlinksldjump"/>
+              </a:rPr>
+              <a:t>7</a:t>
+            </a:r>
+            <a:r>
+              <a:rPr lang="de-DE" dirty="0">
+                <a:hlinkClick r:id="rId3" action="ppaction://hlinksldjump"/>
+              </a:rPr>
+              <a:t>]</a:t>
             </a:r>
             <a:r>
               <a:rPr lang="de-DE" dirty="0"/>
@@ -10521,10 +10818,9 @@
               <a:buChar char="•"/>
             </a:pPr>
             <a:r>
-              <a:rPr lang="de-DE"/>
+              <a:rPr lang="de-DE" dirty="0"/>
               <a:t>JavaScript überprüft nicht, ob Typen korrekt zugewiesen werden</a:t>
             </a:r>
-            <a:endParaRPr lang="de-DE" dirty="0"/>
           </a:p>
           <a:p>
             <a:pPr marL="800100" lvl="1" indent="-342900" algn="l">
@@ -10535,14 +10831,50 @@
               <a:buChar char="•"/>
             </a:pPr>
             <a:r>
-              <a:rPr lang="de-DE" sz="1900">
+              <a:rPr lang="de-DE" sz="1900" dirty="0" err="1">
                 <a:latin typeface="+mj-lt"/>
               </a:rPr>
-              <a:t>TypeScript fügt statische Typisierung und Klassen hinzu</a:t>
-            </a:r>
-            <a:endParaRPr lang="en-AT" sz="1900" dirty="0">
-              <a:latin typeface="+mj-lt"/>
-            </a:endParaRPr>
+              <a:t>TypeScript</a:t>
+            </a:r>
+            <a:r>
+              <a:rPr lang="de-DE" sz="1900" dirty="0">
+                <a:latin typeface="+mj-lt"/>
+              </a:rPr>
+              <a:t> fügt statische Typisierung und Klassen hinzu</a:t>
+            </a:r>
+            <a:r>
+              <a:rPr lang="en-AT" sz="1900" dirty="0">
+                <a:latin typeface="+mj-lt"/>
+              </a:rPr>
+              <a:t> </a:t>
+            </a:r>
+            <a:r>
+              <a:rPr lang="de-DE" sz="1900" dirty="0">
+                <a:latin typeface="+mj-lt"/>
+                <a:hlinkClick r:id="rId3" action="ppaction://hlinksldjump"/>
+              </a:rPr>
+              <a:t>[</a:t>
+            </a:r>
+            <a:r>
+              <a:rPr lang="en-AT" sz="1900" dirty="0">
+                <a:latin typeface="+mj-lt"/>
+                <a:hlinkClick r:id="rId3" action="ppaction://hlinksldjump"/>
+              </a:rPr>
+              <a:t>3</a:t>
+            </a:r>
+            <a:r>
+              <a:rPr lang="de-DE" sz="1900" dirty="0">
+                <a:latin typeface="+mj-lt"/>
+                <a:hlinkClick r:id="rId3" action="ppaction://hlinksldjump"/>
+              </a:rPr>
+              <a:t>]</a:t>
+            </a:r>
+            <a:r>
+              <a:rPr lang="de-DE" sz="1900" dirty="0">
+                <a:latin typeface="+mj-lt"/>
+              </a:rPr>
+              <a:t> </a:t>
+            </a:r>
           </a:p>
           <a:p>
             <a:pPr marL="342900" indent="-342900">
@@ -10553,10 +10885,9 @@
               <a:buChar char="•"/>
             </a:pPr>
             <a:r>
-              <a:rPr lang="de-DE"/>
+              <a:rPr lang="de-DE" dirty="0"/>
               <a:t>Fertiger Code wird zu einem ausführbaren JavaScript Programm kompiliert</a:t>
             </a:r>
-            <a:endParaRPr lang="en-AT" dirty="0"/>
           </a:p>
           <a:p>
             <a:pPr marL="342900" indent="-342900">
@@ -10567,14 +10898,17 @@
               <a:buChar char="•"/>
             </a:pPr>
             <a:r>
-              <a:rPr lang="de-DE">
-                <a:latin typeface="+mj-lt"/>
-              </a:rPr>
-              <a:t>Backend:</a:t>
-            </a:r>
-            <a:endParaRPr lang="de-DE" dirty="0">
-              <a:latin typeface="+mj-lt"/>
-            </a:endParaRPr>
+              <a:rPr lang="de-DE" dirty="0"/>
+              <a:t>Backend besteh</a:t>
+            </a:r>
+            <a:r>
+              <a:rPr lang="en-AT" dirty="0"/>
+              <a:t>end</a:t>
+            </a:r>
+            <a:r>
+              <a:rPr lang="de-DE" dirty="0"/>
+              <a:t> aus:</a:t>
+            </a:r>
           </a:p>
           <a:p>
             <a:pPr marL="742950" lvl="1" indent="-285750" algn="l">
@@ -10585,14 +10919,11 @@
               <a:buChar char="•"/>
             </a:pPr>
             <a:r>
-              <a:rPr lang="de-DE" sz="1900">
+              <a:rPr lang="de-DE" sz="1900" dirty="0">
                 <a:latin typeface="+mj-lt"/>
               </a:rPr>
               <a:t>Simulierte CPU</a:t>
             </a:r>
-            <a:endParaRPr lang="de-DE" sz="1900" dirty="0">
-              <a:latin typeface="+mj-lt"/>
-            </a:endParaRPr>
           </a:p>
           <a:p>
             <a:pPr marL="742950" lvl="1" indent="-285750" algn="l">
@@ -10603,14 +10934,11 @@
               <a:buChar char="•"/>
             </a:pPr>
             <a:r>
-              <a:rPr lang="de-DE" sz="1900">
+              <a:rPr lang="de-DE" sz="1900" dirty="0">
                 <a:latin typeface="+mj-lt"/>
               </a:rPr>
               <a:t>Parser</a:t>
             </a:r>
-            <a:endParaRPr lang="de-DE" sz="1900" dirty="0">
-              <a:latin typeface="+mj-lt"/>
-            </a:endParaRPr>
           </a:p>
           <a:p>
             <a:pPr marL="742950" lvl="1" indent="-285750" algn="l">
@@ -10621,60 +10949,11 @@
               <a:buChar char="•"/>
             </a:pPr>
             <a:r>
-              <a:rPr lang="de-DE" sz="1900">
+              <a:rPr lang="de-DE" sz="1900" dirty="0">
                 <a:latin typeface="+mj-lt"/>
               </a:rPr>
               <a:t>Debugger</a:t>
             </a:r>
-            <a:endParaRPr lang="de-DE" sz="1900" dirty="0">
-              <a:latin typeface="+mj-lt"/>
-            </a:endParaRPr>
-          </a:p>
-          <a:p>
-            <a:pPr marL="342900" indent="-342900">
-              <a:lnSpc>
-                <a:spcPct val="100000"/>
-              </a:lnSpc>
-              <a:buFont typeface="Arial" panose="020B0604020202020204" pitchFamily="34" charset="0"/>
-              <a:buChar char="•"/>
-            </a:pPr>
-            <a:endParaRPr lang="de-DE" dirty="0"/>
-          </a:p>
-          <a:p>
-            <a:pPr marL="800100" lvl="1" indent="-342900" algn="l">
-              <a:lnSpc>
-                <a:spcPct val="100000"/>
-              </a:lnSpc>
-              <a:buFont typeface="Arial" panose="020B0604020202020204" pitchFamily="34" charset="0"/>
-              <a:buChar char="•"/>
-            </a:pPr>
-            <a:endParaRPr lang="de-DE" sz="1900" dirty="0">
-              <a:latin typeface="+mj-lt"/>
-            </a:endParaRPr>
-          </a:p>
-          <a:p>
-            <a:pPr marL="800100" lvl="1" indent="-342900" algn="l">
-              <a:lnSpc>
-                <a:spcPct val="100000"/>
-              </a:lnSpc>
-              <a:buFont typeface="Arial" panose="020B0604020202020204" pitchFamily="34" charset="0"/>
-              <a:buChar char="•"/>
-            </a:pPr>
-            <a:endParaRPr lang="de-DE" sz="1900" dirty="0">
-              <a:latin typeface="+mj-lt"/>
-            </a:endParaRPr>
-          </a:p>
-          <a:p>
-            <a:pPr marL="800100" lvl="1" indent="-342900" algn="l">
-              <a:lnSpc>
-                <a:spcPct val="100000"/>
-              </a:lnSpc>
-              <a:buFont typeface="Arial" panose="020B0604020202020204" pitchFamily="34" charset="0"/>
-              <a:buChar char="•"/>
-            </a:pPr>
-            <a:endParaRPr lang="de-DE" sz="1900" dirty="0">
-              <a:latin typeface="+mj-lt"/>
-            </a:endParaRPr>
           </a:p>
         </p:txBody>
       </p:sp>
@@ -11448,7 +11727,37 @@
             </a:pPr>
             <a:r>
               <a:rPr lang="de-DE" dirty="0"/>
-              <a:t>Erzeugen eines Parsers auf einer vordefinierten Grammatik mit </a:t>
+              <a:t>Erzeugen eines Parsers basierend auf einer </a:t>
+            </a:r>
+            <a:r>
+              <a:rPr lang="de-DE" dirty="0" err="1"/>
+              <a:t>Parsing</a:t>
+            </a:r>
+            <a:r>
+              <a:rPr lang="de-DE" dirty="0"/>
+              <a:t> Expression Grammatik (PEG) </a:t>
+            </a:r>
+            <a:r>
+              <a:rPr lang="de-DE" dirty="0">
+                <a:hlinkClick r:id="rId3" action="ppaction://hlinksldjump"/>
+              </a:rPr>
+              <a:t>[</a:t>
+            </a:r>
+            <a:r>
+              <a:rPr lang="en-AT" dirty="0">
+                <a:hlinkClick r:id="rId3" action="ppaction://hlinksldjump"/>
+              </a:rPr>
+              <a:t>6</a:t>
+            </a:r>
+            <a:r>
+              <a:rPr lang="de-DE" dirty="0">
+                <a:hlinkClick r:id="rId3" action="ppaction://hlinksldjump"/>
+              </a:rPr>
+              <a:t>]</a:t>
+            </a:r>
+            <a:r>
+              <a:rPr lang="de-DE" dirty="0"/>
+              <a:t> mit </a:t>
             </a:r>
             <a:r>
               <a:rPr lang="de-DE" dirty="0" err="1"/>
@@ -11462,7 +11771,19 @@
               <a:rPr lang="de-DE" dirty="0">
                 <a:hlinkClick r:id="rId3" action="ppaction://hlinksldjump"/>
               </a:rPr>
-              <a:t>[3]</a:t>
+              <a:t>[</a:t>
+            </a:r>
+            <a:r>
+              <a:rPr lang="en-AT" dirty="0">
+                <a:hlinkClick r:id="rId3" action="ppaction://hlinksldjump"/>
+              </a:rPr>
+              <a:t>4</a:t>
+            </a:r>
+            <a:r>
+              <a:rPr lang="de-DE" dirty="0">
+                <a:hlinkClick r:id="rId3" action="ppaction://hlinksldjump"/>
+              </a:rPr>
+              <a:t>]</a:t>
             </a:r>
             <a:endParaRPr lang="de-DE" dirty="0"/>
           </a:p>
@@ -11505,10 +11826,61 @@
               <a:buChar char="•"/>
             </a:pPr>
             <a:r>
-              <a:rPr lang="de-DE"/>
-              <a:t>Beispielgrammatik, die 2 Instruktionen und einem Datenbereich erkennt</a:t>
-            </a:r>
-            <a:endParaRPr lang="de-DE" dirty="0"/>
+              <a:rPr lang="de-DE" dirty="0"/>
+              <a:t>Beispielgrammatik, die </a:t>
+            </a:r>
+            <a:r>
+              <a:rPr lang="de-DE" dirty="0">
+                <a:latin typeface="Constantia" panose="02030602050306030303" pitchFamily="18" charset="0"/>
+              </a:rPr>
+              <a:t>MOV</a:t>
+            </a:r>
+            <a:r>
+              <a:rPr lang="de-DE" dirty="0"/>
+              <a:t> Instruktion oder einen Datenbereich erkennt</a:t>
+            </a:r>
+          </a:p>
+          <a:p>
+            <a:pPr marL="800100" lvl="1" indent="-342900" algn="l">
+              <a:lnSpc>
+                <a:spcPct val="100000"/>
+              </a:lnSpc>
+              <a:buFont typeface="Arial" panose="020B0604020202020204" pitchFamily="34" charset="0"/>
+              <a:buChar char="•"/>
+            </a:pPr>
+            <a:r>
+              <a:rPr lang="de-DE" sz="1900" dirty="0">
+                <a:latin typeface="+mj-lt"/>
+              </a:rPr>
+              <a:t>Optionaler Barrel-</a:t>
+            </a:r>
+            <a:r>
+              <a:rPr lang="de-DE" sz="1900" dirty="0" err="1">
+                <a:latin typeface="+mj-lt"/>
+              </a:rPr>
+              <a:t>Shifter</a:t>
+            </a:r>
+            <a:r>
+              <a:rPr lang="de-DE" sz="1900" dirty="0">
+                <a:latin typeface="+mj-lt"/>
+              </a:rPr>
+              <a:t> für die </a:t>
+            </a:r>
+            <a:r>
+              <a:rPr lang="de-DE" sz="1900" dirty="0">
+                <a:solidFill>
+                  <a:srgbClr val="343433"/>
+                </a:solidFill>
+                <a:latin typeface="Constantia" panose="02030602050306030303" pitchFamily="18" charset="0"/>
+              </a:rPr>
+              <a:t>MOV </a:t>
+            </a:r>
+            <a:r>
+              <a:rPr lang="de-DE" sz="1900" dirty="0">
+                <a:latin typeface="+mj-lt"/>
+              </a:rPr>
+              <a:t>Operation</a:t>
+            </a:r>
           </a:p>
           <a:p>
             <a:pPr marL="342900" indent="-342900">
@@ -11519,34 +11891,62 @@
               <a:buChar char="•"/>
             </a:pPr>
             <a:r>
-              <a:rPr lang="de-DE"/>
-              <a:t>Speichern der wichtigen Werte mit </a:t>
-            </a:r>
-            <a:r>
-              <a:rPr lang="de-DE">
+              <a:rPr lang="de-DE" dirty="0"/>
+              <a:t>Speichern der geparsten Werte mit </a:t>
+            </a:r>
+            <a:r>
+              <a:rPr lang="de-DE" dirty="0" err="1">
                 <a:latin typeface="Constantia" panose="02030602050306030303" pitchFamily="18" charset="0"/>
               </a:rPr>
-              <a:t>inst=‘MOV’</a:t>
-            </a:r>
-            <a:r>
-              <a:rPr lang="de-DE"/>
-              <a:t> oder </a:t>
-            </a:r>
-            <a:r>
-              <a:rPr lang="de-DE">
+              <a:t>inst</a:t>
+            </a:r>
+            <a:r>
+              <a:rPr lang="de-DE" dirty="0">
                 <a:latin typeface="Constantia" panose="02030602050306030303" pitchFamily="18" charset="0"/>
               </a:rPr>
-              <a:t>reg=‘r[</a:t>
-            </a:r>
-            <a:r>
-              <a:rPr lang="de-DE"/>
+              <a:t>=‘MOV’ </a:t>
+            </a:r>
+            <a:r>
+              <a:rPr lang="de-DE" dirty="0"/>
+              <a:t>oder </a:t>
+            </a:r>
+            <a:r>
+              <a:rPr lang="de-DE" dirty="0">
+                <a:latin typeface="Constantia" panose="02030602050306030303" pitchFamily="18" charset="0"/>
+              </a:rPr>
+              <a:t>r</a:t>
+            </a:r>
+            <a:r>
+              <a:rPr lang="de-DE" dirty="0"/>
+              <a:t>1</a:t>
+            </a:r>
+            <a:r>
+              <a:rPr lang="de-DE" dirty="0">
+                <a:latin typeface="Constantia" panose="02030602050306030303" pitchFamily="18" charset="0"/>
+              </a:rPr>
+              <a:t>=‘r[</a:t>
+            </a:r>
+            <a:r>
+              <a:rPr lang="de-DE" dirty="0"/>
               <a:t>0-9</a:t>
             </a:r>
             <a:r>
-              <a:rPr lang="de-DE">
+              <a:rPr lang="de-DE" dirty="0">
                 <a:latin typeface="Constantia" panose="02030602050306030303" pitchFamily="18" charset="0"/>
               </a:rPr>
               <a:t>]+’</a:t>
+            </a:r>
+            <a:r>
+              <a:rPr lang="de-DE" dirty="0"/>
+              <a:t> in einem Abstract Syntax </a:t>
+            </a:r>
+            <a:r>
+              <a:rPr lang="de-DE" dirty="0" err="1"/>
+              <a:t>Tree</a:t>
+            </a:r>
+            <a:r>
+              <a:rPr lang="de-DE" dirty="0"/>
+              <a:t> (AST)</a:t>
             </a:r>
             <a:endParaRPr lang="de-DE" dirty="0">
               <a:latin typeface="Constantia" panose="02030602050306030303" pitchFamily="18" charset="0"/>
@@ -11561,46 +11961,9 @@
               <a:buChar char="•"/>
             </a:pPr>
             <a:r>
-              <a:rPr lang="de-DE"/>
+              <a:rPr lang="de-DE" dirty="0"/>
               <a:t>Weitergabe an CPU, die Instruktionen ausführt</a:t>
             </a:r>
-            <a:endParaRPr lang="de-DE" dirty="0"/>
-          </a:p>
-          <a:p>
-            <a:pPr marL="800100" lvl="1" indent="-342900" algn="l">
-              <a:lnSpc>
-                <a:spcPct val="100000"/>
-              </a:lnSpc>
-              <a:buFont typeface="Arial" panose="020B0604020202020204" pitchFamily="34" charset="0"/>
-              <a:buChar char="•"/>
-            </a:pPr>
-            <a:endParaRPr lang="de-DE" dirty="0">
-              <a:latin typeface="+mj-lt"/>
-            </a:endParaRPr>
-          </a:p>
-          <a:p>
-            <a:pPr marL="800100" lvl="1" indent="-342900" algn="l">
-              <a:lnSpc>
-                <a:spcPct val="100000"/>
-              </a:lnSpc>
-              <a:buFont typeface="Arial" panose="020B0604020202020204" pitchFamily="34" charset="0"/>
-              <a:buChar char="•"/>
-            </a:pPr>
-            <a:endParaRPr lang="de-DE" dirty="0">
-              <a:latin typeface="+mj-lt"/>
-            </a:endParaRPr>
-          </a:p>
-          <a:p>
-            <a:pPr marL="800100" lvl="1" indent="-342900" algn="l">
-              <a:lnSpc>
-                <a:spcPct val="100000"/>
-              </a:lnSpc>
-              <a:buFont typeface="Arial" panose="020B0604020202020204" pitchFamily="34" charset="0"/>
-              <a:buChar char="•"/>
-            </a:pPr>
-            <a:endParaRPr lang="de-DE" dirty="0">
-              <a:latin typeface="+mj-lt"/>
-            </a:endParaRPr>
           </a:p>
         </p:txBody>
       </p:sp>
@@ -11960,10 +12323,10 @@
       </p:sp>
       <p:pic>
         <p:nvPicPr>
-          <p:cNvPr id="5" name="Picture 4" descr="A picture containing calendar&#10;&#10;Description automatically generated">
+          <p:cNvPr id="6" name="Picture 5" descr="A picture containing text&#10;&#10;Description automatically generated">
             <a:extLst>
               <a:ext uri="{FF2B5EF4-FFF2-40B4-BE49-F238E27FC236}">
-                <a16:creationId xmlns:a16="http://schemas.microsoft.com/office/drawing/2014/main" id="{BADCEF65-F786-46DC-B92B-072F2751AC2B}"/>
+                <a16:creationId xmlns:a16="http://schemas.microsoft.com/office/drawing/2014/main" id="{8BBA2EA8-BB44-496F-9715-902A0E870ACD}"/>
               </a:ext>
             </a:extLst>
           </p:cNvPr>
@@ -11980,8 +12343,8 @@
         </p:blipFill>
         <p:spPr>
           <a:xfrm>
-            <a:off x="1271464" y="2819087"/>
-            <a:ext cx="7056784" cy="1329993"/>
+            <a:off x="1270800" y="2818800"/>
+            <a:ext cx="7056783" cy="1338558"/>
           </a:xfrm>
           <a:prstGeom prst="rect">
             <a:avLst/>
@@ -12032,7 +12395,11 @@
                                           </p:stCondLst>
                                         </p:cTn>
                                         <p:tgtEl>
-                                          <p:spTgt spid="5"/>
+                                          <p:spTgt spid="12">
+                                            <p:txEl>
+                                              <p:pRg st="4" end="4"/>
+                                            </p:txEl>
+                                          </p:spTgt>
                                         </p:tgtEl>
                                         <p:attrNameLst>
                                           <p:attrName>style.visibility</p:attrName>
@@ -12059,11 +12426,7 @@
                                           </p:stCondLst>
                                         </p:cTn>
                                         <p:tgtEl>
-                                          <p:spTgt spid="12">
-                                            <p:txEl>
-                                              <p:pRg st="4" end="4"/>
-                                            </p:txEl>
-                                          </p:spTgt>
+                                          <p:spTgt spid="6"/>
                                         </p:tgtEl>
                                         <p:attrNameLst>
                                           <p:attrName>style.visibility</p:attrName>
@@ -12180,6 +12543,55 @@
                       </p:childTnLst>
                     </p:cTn>
                   </p:par>
+                  <p:par>
+                    <p:cTn id="17" fill="hold">
+                      <p:stCondLst>
+                        <p:cond delay="indefinite"/>
+                      </p:stCondLst>
+                      <p:childTnLst>
+                        <p:par>
+                          <p:cTn id="18" fill="hold">
+                            <p:stCondLst>
+                              <p:cond delay="0"/>
+                            </p:stCondLst>
+                            <p:childTnLst>
+                              <p:par>
+                                <p:cTn id="19" presetID="1" presetClass="entr" presetSubtype="0" fill="hold" nodeType="clickEffect">
+                                  <p:stCondLst>
+                                    <p:cond delay="0"/>
+                                  </p:stCondLst>
+                                  <p:childTnLst>
+                                    <p:set>
+                                      <p:cBhvr>
+                                        <p:cTn id="20" dur="1" fill="hold">
+                                          <p:stCondLst>
+                                            <p:cond delay="0"/>
+                                          </p:stCondLst>
+                                        </p:cTn>
+                                        <p:tgtEl>
+                                          <p:spTgt spid="12">
+                                            <p:txEl>
+                                              <p:pRg st="7" end="7"/>
+                                            </p:txEl>
+                                          </p:spTgt>
+                                        </p:tgtEl>
+                                        <p:attrNameLst>
+                                          <p:attrName>style.visibility</p:attrName>
+                                        </p:attrNameLst>
+                                      </p:cBhvr>
+                                      <p:to>
+                                        <p:strVal val="visible"/>
+                                      </p:to>
+                                    </p:set>
+                                  </p:childTnLst>
+                                </p:cTn>
+                              </p:par>
+                            </p:childTnLst>
+                          </p:cTn>
+                        </p:par>
+                      </p:childTnLst>
+                    </p:cTn>
+                  </p:par>
                 </p:childTnLst>
               </p:cTn>
               <p:prevCondLst>
@@ -12423,6 +12835,12 @@
               <a:buChar char="•"/>
             </a:pPr>
             <a:r>
+              <a:rPr lang="de-DE" sz="1900" i="1" dirty="0">
+                <a:latin typeface="+mj-lt"/>
+              </a:rPr>
+              <a:t>Pause/</a:t>
+            </a:r>
+            <a:r>
               <a:rPr lang="de-DE" sz="1900" i="1" dirty="0" err="1">
                 <a:latin typeface="+mj-lt"/>
               </a:rPr>
@@ -12432,7 +12850,7 @@
               <a:rPr lang="de-DE" sz="1900" dirty="0">
                 <a:latin typeface="+mj-lt"/>
               </a:rPr>
-              <a:t> – Beenden der Ausführung</a:t>
+              <a:t> – Pausieren/Beenden der Ausführung</a:t>
             </a:r>
             <a:endParaRPr lang="de-DE" dirty="0">
               <a:latin typeface="+mj-lt"/>
@@ -13196,7 +13614,7 @@
           <a:p>
             <a:r>
               <a:rPr lang="en-AT" dirty="0"/>
-              <a:t>React</a:t>
+              <a:t>Frontend</a:t>
             </a:r>
             <a:endParaRPr lang="de-DE" dirty="0"/>
           </a:p>
@@ -13244,7 +13662,7 @@
               <a:rPr lang="en-AT" dirty="0">
                 <a:hlinkClick r:id="rId3" action="ppaction://hlinksldjump"/>
               </a:rPr>
-              <a:t>4</a:t>
+              <a:t>5</a:t>
             </a:r>
             <a:r>
               <a:rPr lang="de-DE" dirty="0">
@@ -13375,30 +13793,6 @@
               </a:rPr>
               <a:t>Register und des Stack</a:t>
             </a:r>
-          </a:p>
-          <a:p>
-            <a:pPr marL="800100" lvl="1" indent="-342900" algn="l">
-              <a:lnSpc>
-                <a:spcPct val="100000"/>
-              </a:lnSpc>
-              <a:buFont typeface="Arial" panose="020B0604020202020204" pitchFamily="34" charset="0"/>
-              <a:buChar char="•"/>
-            </a:pPr>
-            <a:endParaRPr lang="de-DE" sz="1900" dirty="0">
-              <a:latin typeface="+mj-lt"/>
-            </a:endParaRPr>
-          </a:p>
-          <a:p>
-            <a:pPr marL="800100" lvl="1" indent="-342900" algn="l">
-              <a:lnSpc>
-                <a:spcPct val="100000"/>
-              </a:lnSpc>
-              <a:buFont typeface="Arial" panose="020B0604020202020204" pitchFamily="34" charset="0"/>
-              <a:buChar char="•"/>
-            </a:pPr>
-            <a:endParaRPr lang="de-DE" sz="1900" dirty="0">
-              <a:latin typeface="+mj-lt"/>
-            </a:endParaRPr>
           </a:p>
         </p:txBody>
       </p:sp>

</xml_diff>